<commit_message>
00course.dat, typo in stationary-distribution.pptx, update spring15 listing in makefile
</commit_message>
<xml_diff>
--- a/fall13/slidesF13/stationary-distribution.pptx
+++ b/fall13/slidesF13/stationary-distribution.pptx
@@ -6209,15 +6209,7 @@
                   <a:srgbClr val="FF00FF"/>
                 </a:solidFill>
               </a:rPr>
-              <a:t>edge probability </a:t>
-            </a:r>
-            <a:r>
-              <a:rPr lang="en-US" sz="4400" dirty="0" smtClean="0">
-                <a:solidFill>
-                  <a:srgbClr val="FF00FF"/>
-                </a:solidFill>
-              </a:rPr>
-              <a:t>matrix</a:t>
+              <a:t>edge probability matrix</a:t>
             </a:r>
             <a:endParaRPr lang="en-US" sz="4400" dirty="0" smtClean="0">
               <a:solidFill>
@@ -6231,19 +6223,7 @@
             </a:pPr>
             <a:r>
               <a:rPr lang="en-US" sz="4400" dirty="0" smtClean="0"/>
-              <a:t>for </a:t>
-            </a:r>
-            <a:r>
-              <a:rPr lang="en-US" sz="4400" dirty="0" smtClean="0"/>
-              <a:t>a </a:t>
-            </a:r>
-            <a:r>
-              <a:rPr lang="en-US" sz="4400" dirty="0" smtClean="0"/>
-              <a:t>random walk graph </a:t>
-            </a:r>
-            <a:r>
-              <a:rPr lang="en-US" sz="4400" dirty="0" smtClean="0"/>
-              <a:t>is the</a:t>
+              <a:t>for a random walk graph is the</a:t>
             </a:r>
           </a:p>
           <a:p>
@@ -6471,15 +6451,7 @@
                   <a:srgbClr val="FF00FF"/>
                 </a:solidFill>
               </a:rPr>
-              <a:t>edge </a:t>
-            </a:r>
-            <a:r>
-              <a:rPr lang="en-US" sz="4400" dirty="0" smtClean="0">
-                <a:solidFill>
-                  <a:srgbClr val="FF00FF"/>
-                </a:solidFill>
-              </a:rPr>
-              <a:t>probability matrix </a:t>
+              <a:t>edge probability matrix </a:t>
             </a:r>
             <a:r>
               <a:rPr lang="en-US" sz="4400" dirty="0" smtClean="0">
@@ -6556,13 +6528,6 @@
               </a:rPr>
               <a:t> </a:t>
             </a:r>
-            <a:endParaRPr lang="en-US" sz="4400" b="1" dirty="0" smtClean="0">
-              <a:solidFill>
-                <a:srgbClr val="0000FF"/>
-              </a:solidFill>
-              <a:latin typeface="Euclid Symbol" charset="2"/>
-              <a:cs typeface="Euclid Symbol" charset="2"/>
-            </a:endParaRPr>
           </a:p>
           <a:p>
             <a:pPr marL="0" indent="0">
@@ -6724,7 +6689,7 @@
           <a:graphicData uri="http://schemas.openxmlformats.org/presentationml/2006/ole">
             <mc:AlternateContent xmlns:mc="http://schemas.openxmlformats.org/markup-compatibility/2006">
               <mc:Choice xmlns:v="urn:schemas-microsoft-com:vml" Requires="v">
-                <p:oleObj spid="_x0000_s176133" name="Equation" r:id="rId3" imgW="1282700" imgH="292100" progId="Equation.DSMT4">
+                <p:oleObj spid="_x0000_s176136" name="Equation" r:id="rId3" imgW="1282700" imgH="292100" progId="Equation.DSMT4">
                   <p:embed/>
                 </p:oleObj>
               </mc:Choice>
@@ -6995,7 +6960,7 @@
           <a:graphicData uri="http://schemas.openxmlformats.org/presentationml/2006/ole">
             <mc:AlternateContent xmlns:mc="http://schemas.openxmlformats.org/markup-compatibility/2006">
               <mc:Choice xmlns:v="urn:schemas-microsoft-com:vml" Requires="v">
-                <p:oleObj spid="_x0000_s174091" name="Equation" r:id="rId3" imgW="1879600" imgH="914400" progId="Equation.DSMT4">
+                <p:oleObj spid="_x0000_s174094" name="Equation" r:id="rId3" imgW="1879600" imgH="914400" progId="Equation.DSMT4">
                   <p:embed/>
                 </p:oleObj>
               </mc:Choice>
@@ -7266,7 +7231,7 @@
           <a:graphicData uri="http://schemas.openxmlformats.org/presentationml/2006/ole">
             <mc:AlternateContent xmlns:mc="http://schemas.openxmlformats.org/markup-compatibility/2006">
               <mc:Choice xmlns:v="urn:schemas-microsoft-com:vml" Requires="v">
-                <p:oleObj spid="_x0000_s169996" name="Equation" r:id="rId4" imgW="2895600" imgH="990600" progId="Equation.DSMT4">
+                <p:oleObj spid="_x0000_s169999" name="Equation" r:id="rId4" imgW="2895600" imgH="990600" progId="Equation.DSMT4">
                   <p:embed/>
                 </p:oleObj>
               </mc:Choice>
@@ -7528,7 +7493,7 @@
           <a:graphicData uri="http://schemas.openxmlformats.org/presentationml/2006/ole">
             <mc:AlternateContent xmlns:mc="http://schemas.openxmlformats.org/markup-compatibility/2006">
               <mc:Choice xmlns:v="urn:schemas-microsoft-com:vml" Requires="v">
-                <p:oleObj spid="_x0000_s173067" name="Equation" r:id="rId4" imgW="2895600" imgH="965200" progId="Equation.DSMT4">
+                <p:oleObj spid="_x0000_s173070" name="Equation" r:id="rId4" imgW="2895600" imgH="965200" progId="Equation.DSMT4">
                   <p:embed/>
                 </p:oleObj>
               </mc:Choice>
@@ -7573,13 +7538,13 @@
   <p:clrMapOvr>
     <a:masterClrMapping/>
   </p:clrMapOvr>
-  <mc:AlternateContent xmlns:mc="http://schemas.openxmlformats.org/markup-compatibility/2006">
-    <mc:Choice xmlns:p14="http://schemas.microsoft.com/office/powerpoint/2010/main" Requires="p14">
+  <mc:AlternateContent xmlns:mc="http://schemas.openxmlformats.org/markup-compatibility/2006" xmlns:p14="http://schemas.microsoft.com/office/powerpoint/2010/main">
+    <mc:Choice Requires="p14">
       <p:transition spd="med" p14:dur="700" advClick="0">
         <p:fade/>
       </p:transition>
     </mc:Choice>
-    <mc:Fallback>
+    <mc:Fallback xmlns="">
       <p:transition xmlns:p14="http://schemas.microsoft.com/office/powerpoint/2010/main" spd="med" advClick="0">
         <p:fade/>
       </p:transition>
@@ -7799,7 +7764,7 @@
           <a:graphicData uri="http://schemas.openxmlformats.org/presentationml/2006/ole">
             <mc:AlternateContent xmlns:mc="http://schemas.openxmlformats.org/markup-compatibility/2006">
               <mc:Choice xmlns:v="urn:schemas-microsoft-com:vml" Requires="v">
-                <p:oleObj spid="_x0000_s165913" name="Equation" r:id="rId3" imgW="2044700" imgH="863600" progId="Equation.DSMT4">
+                <p:oleObj spid="_x0000_s165916" name="Equation" r:id="rId3" imgW="2044700" imgH="863600" progId="Equation.DSMT4">
                   <p:embed/>
                 </p:oleObj>
               </mc:Choice>
@@ -8070,7 +8035,7 @@
           <a:graphicData uri="http://schemas.openxmlformats.org/presentationml/2006/ole">
             <mc:AlternateContent xmlns:mc="http://schemas.openxmlformats.org/markup-compatibility/2006">
               <mc:Choice xmlns:v="urn:schemas-microsoft-com:vml" Requires="v">
-                <p:oleObj spid="_x0000_s166936" name="Equation" r:id="rId4" imgW="2044700" imgH="736600" progId="Equation.DSMT4">
+                <p:oleObj spid="_x0000_s166939" name="Equation" r:id="rId4" imgW="2044700" imgH="736600" progId="Equation.DSMT4">
                   <p:embed/>
                 </p:oleObj>
               </mc:Choice>
@@ -8342,7 +8307,7 @@
           <a:graphicData uri="http://schemas.openxmlformats.org/presentationml/2006/ole">
             <mc:AlternateContent xmlns:mc="http://schemas.openxmlformats.org/markup-compatibility/2006">
               <mc:Choice xmlns:v="urn:schemas-microsoft-com:vml" Requires="v">
-                <p:oleObj spid="_x0000_s167963" name="Equation" r:id="rId4" imgW="1282700" imgH="558800" progId="Equation.DSMT4">
+                <p:oleObj spid="_x0000_s167966" name="Equation" r:id="rId4" imgW="1282700" imgH="558800" progId="Equation.DSMT4">
                   <p:embed/>
                 </p:oleObj>
               </mc:Choice>
@@ -12045,7 +12010,7 @@
           <a:graphicData uri="http://schemas.openxmlformats.org/presentationml/2006/ole">
             <mc:AlternateContent xmlns:mc="http://schemas.openxmlformats.org/markup-compatibility/2006">
               <mc:Choice xmlns:v="urn:schemas-microsoft-com:vml" Requires="v">
-                <p:oleObj spid="_x0000_s1049" name="Equation" r:id="rId4" imgW="1676400" imgH="635000" progId="Equation.DSMT4">
+                <p:oleObj spid="_x0000_s1052" name="Equation" r:id="rId4" imgW="1676400" imgH="635000" progId="Equation.DSMT4">
                   <p:embed/>
                 </p:oleObj>
               </mc:Choice>
@@ -15196,7 +15161,7 @@
           <a:graphicData uri="http://schemas.openxmlformats.org/presentationml/2006/ole">
             <mc:AlternateContent xmlns:mc="http://schemas.openxmlformats.org/markup-compatibility/2006">
               <mc:Choice xmlns:v="urn:schemas-microsoft-com:vml" Requires="v">
-                <p:oleObj spid="_x0000_s114762" name="Equation" r:id="rId4" imgW="914400" imgH="533400" progId="Equation.DSMT4">
+                <p:oleObj spid="_x0000_s114765" name="Equation" r:id="rId4" imgW="914400" imgH="533400" progId="Equation.DSMT4">
                   <p:embed/>
                 </p:oleObj>
               </mc:Choice>
@@ -16221,146 +16186,6 @@
           <a:chExt cx="0" cy="0"/>
         </a:xfrm>
       </p:grpSpPr>
-      <p:grpSp>
-        <p:nvGrpSpPr>
-          <p:cNvPr id="10" name="Group 9"/>
-          <p:cNvGrpSpPr/>
-          <p:nvPr/>
-        </p:nvGrpSpPr>
-        <p:grpSpPr>
-          <a:xfrm>
-            <a:off x="2971800" y="3962400"/>
-            <a:ext cx="2687671" cy="1015663"/>
-            <a:chOff x="3810000" y="3962400"/>
-            <a:chExt cx="2687671" cy="1015663"/>
-          </a:xfrm>
-        </p:grpSpPr>
-        <p:sp>
-          <p:nvSpPr>
-            <p:cNvPr id="31" name="TextBox 30"/>
-            <p:cNvSpPr txBox="1"/>
-            <p:nvPr/>
-          </p:nvSpPr>
-          <p:spPr>
-            <a:xfrm>
-              <a:off x="3810000" y="3962400"/>
-              <a:ext cx="2687671" cy="1015663"/>
-            </a:xfrm>
-            <a:prstGeom prst="rect">
-              <a:avLst/>
-            </a:prstGeom>
-            <a:noFill/>
-          </p:spPr>
-          <p:txBody>
-            <a:bodyPr wrap="none" rtlCol="0">
-              <a:spAutoFit/>
-            </a:bodyPr>
-            <a:lstStyle/>
-            <a:p>
-              <a:r>
-                <a:rPr lang="en-US" sz="5400" dirty="0" smtClean="0">
-                  <a:solidFill>
-                    <a:srgbClr val="0000FF"/>
-                  </a:solidFill>
-                </a:rPr>
-                <a:t>|</a:t>
-              </a:r>
-              <a:r>
-                <a:rPr lang="en-US" sz="3200" baseline="-25000" dirty="0" smtClean="0">
-                  <a:solidFill>
-                    <a:srgbClr val="0000FF"/>
-                  </a:solidFill>
-                </a:rPr>
-                <a:t> </a:t>
-              </a:r>
-              <a:r>
-                <a:rPr lang="en-US" sz="5400" b="1" dirty="0" smtClean="0">
-                  <a:solidFill>
-                    <a:srgbClr val="0000FF"/>
-                  </a:solidFill>
-                </a:rPr>
-                <a:t>s</a:t>
-              </a:r>
-              <a:r>
-                <a:rPr lang="en-US" sz="3200" b="1" baseline="-25000" dirty="0" smtClean="0">
-                  <a:solidFill>
-                    <a:srgbClr val="0000FF"/>
-                  </a:solidFill>
-                </a:rPr>
-                <a:t> </a:t>
-              </a:r>
-              <a:r>
-                <a:rPr lang="en-US" sz="5400" dirty="0" smtClean="0">
-                  <a:solidFill>
-                    <a:srgbClr val="0000FF"/>
-                  </a:solidFill>
-                </a:rPr>
-                <a:t>| </a:t>
-              </a:r>
-              <a:r>
-                <a:rPr lang="en-US" sz="6000" b="1" dirty="0" smtClean="0">
-                  <a:solidFill>
-                    <a:srgbClr val="0000FF"/>
-                  </a:solidFill>
-                  <a:latin typeface="Euclid Symbol" charset="2"/>
-                  <a:cs typeface="Euclid Symbol" charset="2"/>
-                </a:rPr>
-                <a:t>=</a:t>
-              </a:r>
-              <a:r>
-                <a:rPr lang="en-US" sz="6000" dirty="0" smtClean="0">
-                  <a:solidFill>
-                    <a:srgbClr val="0000FF"/>
-                  </a:solidFill>
-                </a:rPr>
-                <a:t> </a:t>
-              </a:r>
-              <a:r>
-                <a:rPr lang="en-US" sz="6000" dirty="0">
-                  <a:solidFill>
-                    <a:srgbClr val="0000FF"/>
-                  </a:solidFill>
-                </a:rPr>
-                <a:t>1</a:t>
-              </a:r>
-              <a:endParaRPr lang="en-US" sz="4800" dirty="0">
-                <a:solidFill>
-                  <a:srgbClr val="0000FF"/>
-                </a:solidFill>
-              </a:endParaRPr>
-            </a:p>
-          </p:txBody>
-        </p:sp>
-        <p:cxnSp>
-          <p:nvCxnSpPr>
-            <p:cNvPr id="32" name="Straight Arrow Connector 31"/>
-            <p:cNvCxnSpPr/>
-            <p:nvPr/>
-          </p:nvCxnSpPr>
-          <p:spPr bwMode="auto">
-            <a:xfrm>
-              <a:off x="4267200" y="4267200"/>
-              <a:ext cx="381000" cy="0"/>
-            </a:xfrm>
-            <a:prstGeom prst="straightConnector1">
-              <a:avLst/>
-            </a:prstGeom>
-            <a:solidFill>
-              <a:schemeClr val="accent1"/>
-            </a:solidFill>
-            <a:ln w="38100" cap="flat" cmpd="sng" algn="ctr">
-              <a:solidFill>
-                <a:srgbClr val="0000FF"/>
-              </a:solidFill>
-              <a:prstDash val="solid"/>
-              <a:round/>
-              <a:headEnd type="none" w="med" len="med"/>
-              <a:tailEnd type="arrow" w="sm" len="sm"/>
-            </a:ln>
-            <a:effectLst/>
-          </p:spPr>
-        </p:cxnSp>
-      </p:grpSp>
       <p:sp>
         <p:nvSpPr>
           <p:cNvPr id="3" name="Content Placeholder 2"/>
@@ -16793,6 +16618,104 @@
           </p:spPr>
         </p:cxnSp>
       </p:grpSp>
+      <p:sp>
+        <p:nvSpPr>
+          <p:cNvPr id="20" name="TextBox 19"/>
+          <p:cNvSpPr txBox="1"/>
+          <p:nvPr/>
+        </p:nvSpPr>
+        <p:spPr>
+          <a:xfrm>
+            <a:off x="2895600" y="4343400"/>
+            <a:ext cx="3045731" cy="1107996"/>
+          </a:xfrm>
+          <a:prstGeom prst="rect">
+            <a:avLst/>
+          </a:prstGeom>
+          <a:noFill/>
+        </p:spPr>
+        <p:txBody>
+          <a:bodyPr wrap="square" rtlCol="0">
+            <a:spAutoFit/>
+          </a:bodyPr>
+          <a:lstStyle/>
+          <a:p>
+            <a:r>
+              <a:rPr lang="en-US" sz="6000" b="1" dirty="0" smtClean="0">
+                <a:solidFill>
+                  <a:srgbClr val="0000FF"/>
+                </a:solidFill>
+                <a:latin typeface="AbadiMT-CondensedExtraBold"/>
+              </a:rPr>
+              <a:t>∑</a:t>
+            </a:r>
+            <a:r>
+              <a:rPr lang="en-US" sz="6000" b="1" baseline="-25000" dirty="0" smtClean="0">
+                <a:solidFill>
+                  <a:srgbClr val="0000FF"/>
+                </a:solidFill>
+                <a:latin typeface="AbadiMT-CondensedExtraBold"/>
+              </a:rPr>
+              <a:t> </a:t>
+            </a:r>
+            <a:r>
+              <a:rPr lang="en-US" sz="6000" dirty="0" err="1" smtClean="0">
+                <a:solidFill>
+                  <a:srgbClr val="0000FF"/>
+                </a:solidFill>
+              </a:rPr>
+              <a:t>s</a:t>
+            </a:r>
+            <a:r>
+              <a:rPr lang="en-US" sz="6000" b="1" baseline="-25000" dirty="0" err="1" smtClean="0">
+                <a:solidFill>
+                  <a:srgbClr val="0000FF"/>
+                </a:solidFill>
+              </a:rPr>
+              <a:t>i</a:t>
+            </a:r>
+            <a:r>
+              <a:rPr lang="en-US" sz="3200" b="1" baseline="-25000" dirty="0" smtClean="0">
+                <a:solidFill>
+                  <a:srgbClr val="0000FF"/>
+                </a:solidFill>
+              </a:rPr>
+              <a:t> </a:t>
+            </a:r>
+            <a:r>
+              <a:rPr lang="en-US" sz="5400" dirty="0" smtClean="0">
+                <a:solidFill>
+                  <a:srgbClr val="0000FF"/>
+                </a:solidFill>
+              </a:rPr>
+              <a:t> </a:t>
+            </a:r>
+            <a:r>
+              <a:rPr lang="en-US" sz="6600" b="1" dirty="0" smtClean="0">
+                <a:solidFill>
+                  <a:srgbClr val="0000FF"/>
+                </a:solidFill>
+                <a:latin typeface="Euclid Symbol" charset="2"/>
+                <a:cs typeface="Euclid Symbol" charset="2"/>
+              </a:rPr>
+              <a:t>=</a:t>
+            </a:r>
+            <a:r>
+              <a:rPr lang="en-US" sz="6000" dirty="0" smtClean="0">
+                <a:solidFill>
+                  <a:srgbClr val="0000FF"/>
+                </a:solidFill>
+              </a:rPr>
+              <a:t> 1</a:t>
+            </a:r>
+            <a:endParaRPr lang="en-US" sz="4800" dirty="0">
+              <a:solidFill>
+                <a:srgbClr val="0000FF"/>
+              </a:solidFill>
+            </a:endParaRPr>
+          </a:p>
+        </p:txBody>
+      </p:sp>
     </p:spTree>
     <p:extLst>
       <p:ext uri="{BB962C8B-B14F-4D97-AF65-F5344CB8AC3E}">
@@ -17028,7 +16951,7 @@
                             </p:stCondLst>
                             <p:childTnLst>
                               <p:par>
-                                <p:cTn id="22" presetID="22" presetClass="entr" presetSubtype="8" fill="hold" nodeType="clickEffect">
+                                <p:cTn id="22" presetID="22" presetClass="entr" presetSubtype="8" fill="hold" grpId="0" nodeType="clickEffect">
                                   <p:stCondLst>
                                     <p:cond delay="0"/>
                                   </p:stCondLst>
@@ -17041,7 +16964,7 @@
                                           </p:stCondLst>
                                         </p:cTn>
                                         <p:tgtEl>
-                                          <p:spTgt spid="10"/>
+                                          <p:spTgt spid="20"/>
                                         </p:tgtEl>
                                         <p:attrNameLst>
                                           <p:attrName>style.visibility</p:attrName>
@@ -17055,7 +16978,7 @@
                                       <p:cBhvr>
                                         <p:cTn id="24" dur="1000"/>
                                         <p:tgtEl>
-                                          <p:spTgt spid="10"/>
+                                          <p:spTgt spid="20"/>
                                         </p:tgtEl>
                                       </p:cBhvr>
                                     </p:animEffect>
@@ -17089,6 +17012,9 @@
         </p:cTn>
       </p:par>
     </p:tnLst>
+    <p:bldLst>
+      <p:bldP spid="20" grpId="0"/>
+    </p:bldLst>
   </p:timing>
 </p:sld>
 </file>
@@ -21386,7 +21312,7 @@
           <a:graphicData uri="http://schemas.openxmlformats.org/presentationml/2006/ole">
             <mc:AlternateContent xmlns:mc="http://schemas.openxmlformats.org/markup-compatibility/2006">
               <mc:Choice xmlns:v="urn:schemas-microsoft-com:vml" Requires="v">
-                <p:oleObj spid="_x0000_s27723" name="Equation" r:id="rId4" imgW="736600" imgH="533400" progId="Equation.DSMT4">
+                <p:oleObj spid="_x0000_s27726" name="Equation" r:id="rId4" imgW="736600" imgH="533400" progId="Equation.DSMT4">
                   <p:embed/>
                 </p:oleObj>
               </mc:Choice>
@@ -27011,7 +26937,7 @@
           <a:graphicData uri="http://schemas.openxmlformats.org/presentationml/2006/ole">
             <mc:AlternateContent xmlns:mc="http://schemas.openxmlformats.org/markup-compatibility/2006">
               <mc:Choice xmlns:v="urn:schemas-microsoft-com:vml" Requires="v">
-                <p:oleObj spid="_x0000_s31818" name="Equation" r:id="rId4" imgW="736600" imgH="533400" progId="Equation.DSMT4">
+                <p:oleObj spid="_x0000_s31821" name="Equation" r:id="rId4" imgW="736600" imgH="533400" progId="Equation.DSMT4">
                   <p:embed/>
                 </p:oleObj>
               </mc:Choice>
@@ -28840,7 +28766,7 @@
           <a:graphicData uri="http://schemas.openxmlformats.org/presentationml/2006/ole">
             <mc:AlternateContent xmlns:mc="http://schemas.openxmlformats.org/markup-compatibility/2006">
               <mc:Choice xmlns:v="urn:schemas-microsoft-com:vml" Requires="v">
-                <p:oleObj spid="_x0000_s100426" name="Equation" r:id="rId4" imgW="736600" imgH="533400" progId="Equation.DSMT4">
+                <p:oleObj spid="_x0000_s100429" name="Equation" r:id="rId4" imgW="736600" imgH="533400" progId="Equation.DSMT4">
                   <p:embed/>
                 </p:oleObj>
               </mc:Choice>
@@ -30682,7 +30608,7 @@
           <a:graphicData uri="http://schemas.openxmlformats.org/presentationml/2006/ole">
             <mc:AlternateContent xmlns:mc="http://schemas.openxmlformats.org/markup-compatibility/2006">
               <mc:Choice xmlns:v="urn:schemas-microsoft-com:vml" Requires="v">
-                <p:oleObj spid="_x0000_s162891" name="Equation" r:id="rId4" imgW="736600" imgH="533400" progId="Equation.DSMT4">
+                <p:oleObj spid="_x0000_s162894" name="Equation" r:id="rId4" imgW="736600" imgH="533400" progId="Equation.DSMT4">
                   <p:embed/>
                 </p:oleObj>
               </mc:Choice>
@@ -32851,7 +32777,7 @@
           <a:graphicData uri="http://schemas.openxmlformats.org/presentationml/2006/ole">
             <mc:AlternateContent xmlns:mc="http://schemas.openxmlformats.org/markup-compatibility/2006">
               <mc:Choice xmlns:v="urn:schemas-microsoft-com:vml" Requires="v">
-                <p:oleObj spid="_x0000_s102475" name="Equation" r:id="rId4" imgW="901700" imgH="533400" progId="Equation.DSMT4">
+                <p:oleObj spid="_x0000_s102478" name="Equation" r:id="rId4" imgW="901700" imgH="533400" progId="Equation.DSMT4">
                   <p:embed/>
                 </p:oleObj>
               </mc:Choice>

</xml_diff>